<commit_message>
wallahy da a5r commit
</commit_message>
<xml_diff>
--- a/team 25.pptx
+++ b/team 25.pptx
@@ -23280,7 +23280,7 @@
             </a:pPr>
             <a:r>
               <a:rPr lang="en-US" b="1" i="1" dirty="0"/>
-              <a:t>The accuracy of the model is 79%</a:t>
+              <a:t>The accuracy of the model is 83%</a:t>
             </a:r>
           </a:p>
           <a:p>
@@ -23305,10 +23305,10 @@
       </p:sp>
       <p:pic>
         <p:nvPicPr>
-          <p:cNvPr id="3" name="Picture 2">
+          <p:cNvPr id="4" name="Picture 3">
             <a:extLst>
               <a:ext uri="{FF2B5EF4-FFF2-40B4-BE49-F238E27FC236}">
-                <a16:creationId xmlns:a16="http://schemas.microsoft.com/office/drawing/2014/main" id="{9CE73E2B-571F-A8D9-60D5-57D9C8F1733D}"/>
+                <a16:creationId xmlns:a16="http://schemas.microsoft.com/office/drawing/2014/main" id="{BEF07B73-1E68-47E7-787E-660776D5FB7E}"/>
               </a:ext>
             </a:extLst>
           </p:cNvPr>
@@ -23325,8 +23325,8 @@
         </p:blipFill>
         <p:spPr>
           <a:xfrm>
-            <a:off x="537350" y="2655288"/>
-            <a:ext cx="8069299" cy="2085324"/>
+            <a:off x="586409" y="2858943"/>
+            <a:ext cx="7742583" cy="2088895"/>
           </a:xfrm>
           <a:prstGeom prst="rect">
             <a:avLst/>

</xml_diff>